<commit_message>
Service Bus as per MSDN with acknowledgment.
</commit_message>
<xml_diff>
--- a/Presentations/AzureServiceBus.pptx
+++ b/Presentations/AzureServiceBus.pptx
@@ -16,6 +16,7 @@
     <p:sldId id="274" r:id="rId13"/>
     <p:sldId id="275" r:id="rId14"/>
     <p:sldId id="276" r:id="rId15"/>
+    <p:sldId id="277" r:id="rId16"/>
   </p:sldIdLst>
   <p:sldSz cx="12192000" cy="6858000"/>
   <p:notesSz cx="6858000" cy="9144000"/>
@@ -360,7 +361,7 @@
           <a:p>
             <a:fld id="{ED291B17-9318-49DB-B28B-6E5994AE9581}" type="datetime1">
               <a:rPr lang="en-US" smtClean="0"/>
-              <a:t>3/15/2021</a:t>
+              <a:t>4/1/2021</a:t>
             </a:fld>
             <a:endParaRPr lang="en-US" dirty="0"/>
           </a:p>
@@ -563,7 +564,7 @@
           <a:p>
             <a:fld id="{2CED4963-E985-44C4-B8C4-FDD613B7C2F8}" type="datetime1">
               <a:rPr lang="en-US" smtClean="0"/>
-              <a:t>3/15/2021</a:t>
+              <a:t>4/1/2021</a:t>
             </a:fld>
             <a:endParaRPr lang="en-US" dirty="0"/>
           </a:p>
@@ -925,7 +926,7 @@
           <a:p>
             <a:fld id="{ED291B17-9318-49DB-B28B-6E5994AE9581}" type="datetime1">
               <a:rPr lang="en-US" smtClean="0"/>
-              <a:t>3/15/2021</a:t>
+              <a:t>4/1/2021</a:t>
             </a:fld>
             <a:endParaRPr lang="en-US" dirty="0"/>
           </a:p>
@@ -1123,7 +1124,7 @@
           <a:p>
             <a:fld id="{78DD82B9-B8EE-4375-B6FF-88FA6ABB15D9}" type="datetime1">
               <a:rPr lang="en-US" smtClean="0"/>
-              <a:t>3/15/2021</a:t>
+              <a:t>4/1/2021</a:t>
             </a:fld>
             <a:endParaRPr lang="en-US" dirty="0"/>
           </a:p>
@@ -1435,7 +1436,7 @@
           <a:p>
             <a:fld id="{B2497495-0637-405E-AE64-5CC7506D51F5}" type="datetime1">
               <a:rPr lang="en-US" smtClean="0"/>
-              <a:t>3/15/2021</a:t>
+              <a:t>4/1/2021</a:t>
             </a:fld>
             <a:endParaRPr lang="en-US" dirty="0"/>
           </a:p>
@@ -1688,7 +1689,7 @@
           <a:p>
             <a:fld id="{7BFFD690-9426-415D-8B65-26881E07B2D4}" type="datetime1">
               <a:rPr lang="en-US" smtClean="0"/>
-              <a:t>3/15/2021</a:t>
+              <a:t>4/1/2021</a:t>
             </a:fld>
             <a:endParaRPr lang="en-US" dirty="0"/>
           </a:p>
@@ -2110,7 +2111,7 @@
           <a:p>
             <a:fld id="{04C4989A-474C-40DE-95B9-011C28B71673}" type="datetime1">
               <a:rPr lang="en-US" smtClean="0"/>
-              <a:t>3/15/2021</a:t>
+              <a:t>4/1/2021</a:t>
             </a:fld>
             <a:endParaRPr lang="en-US" dirty="0"/>
           </a:p>
@@ -2233,7 +2234,7 @@
           <a:p>
             <a:fld id="{5DB4ED54-5B5E-4A04-93D3-5772E3CE3818}" type="datetime1">
               <a:rPr lang="en-US" smtClean="0"/>
-              <a:t>3/15/2021</a:t>
+              <a:t>4/1/2021</a:t>
             </a:fld>
             <a:endParaRPr lang="en-US" dirty="0"/>
           </a:p>
@@ -2328,7 +2329,7 @@
           <a:p>
             <a:fld id="{4EDE50D6-574B-40AF-946F-D52A04ADE379}" type="datetime1">
               <a:rPr lang="en-US" smtClean="0"/>
-              <a:t>3/15/2021</a:t>
+              <a:t>4/1/2021</a:t>
             </a:fld>
             <a:endParaRPr lang="en-US" dirty="0"/>
           </a:p>
@@ -2705,7 +2706,7 @@
           <a:p>
             <a:fld id="{D82884F1-FFEA-405F-9602-3DCA865EDA4E}" type="datetime1">
               <a:rPr lang="en-US" smtClean="0"/>
-              <a:t>3/15/2021</a:t>
+              <a:t>4/1/2021</a:t>
             </a:fld>
             <a:endParaRPr lang="en-US" dirty="0"/>
           </a:p>
@@ -2998,7 +2999,7 @@
           <a:p>
             <a:fld id="{7E18DB4A-8810-4A10-AD5C-D5E2C667F5B3}" type="datetime1">
               <a:rPr lang="en-US" smtClean="0"/>
-              <a:t>3/15/2021</a:t>
+              <a:t>4/1/2021</a:t>
             </a:fld>
             <a:endParaRPr lang="en-US" dirty="0"/>
           </a:p>
@@ -3213,7 +3214,7 @@
           <a:p>
             <a:fld id="{ED291B17-9318-49DB-B28B-6E5994AE9581}" type="datetime1">
               <a:rPr lang="en-US" smtClean="0"/>
-              <a:t>3/15/2021</a:t>
+              <a:t>4/1/2021</a:t>
             </a:fld>
             <a:endParaRPr lang="en-US" dirty="0"/>
           </a:p>
@@ -4379,6 +4380,101 @@
 </p:sld>
 </file>
 
+<file path=ppt/slides/slide12.xml><?xml version="1.0" encoding="utf-8"?>
+<p:sld xmlns:a="http://schemas.openxmlformats.org/drawingml/2006/main" xmlns:r="http://schemas.openxmlformats.org/officeDocument/2006/relationships" xmlns:p="http://schemas.openxmlformats.org/presentationml/2006/main">
+  <p:cSld>
+    <p:spTree>
+      <p:nvGrpSpPr>
+        <p:cNvPr id="1" name=""/>
+        <p:cNvGrpSpPr/>
+        <p:nvPr/>
+      </p:nvGrpSpPr>
+      <p:grpSpPr>
+        <a:xfrm>
+          <a:off x="0" y="0"/>
+          <a:ext cx="0" cy="0"/>
+          <a:chOff x="0" y="0"/>
+          <a:chExt cx="0" cy="0"/>
+        </a:xfrm>
+      </p:grpSpPr>
+      <p:sp>
+        <p:nvSpPr>
+          <p:cNvPr id="2" name="Title 1">
+            <a:extLst>
+              <a:ext uri="{FF2B5EF4-FFF2-40B4-BE49-F238E27FC236}">
+                <a16:creationId xmlns:a16="http://schemas.microsoft.com/office/drawing/2014/main" id="{E457ED59-60D4-4FC4-857B-DDFE97C71133}"/>
+              </a:ext>
+            </a:extLst>
+          </p:cNvPr>
+          <p:cNvSpPr>
+            <a:spLocks noGrp="1"/>
+          </p:cNvSpPr>
+          <p:nvPr>
+            <p:ph type="title"/>
+          </p:nvPr>
+        </p:nvSpPr>
+        <p:spPr>
+          <a:xfrm>
+            <a:off x="581192" y="702156"/>
+            <a:ext cx="11029616" cy="440844"/>
+          </a:xfrm>
+        </p:spPr>
+        <p:txBody>
+          <a:bodyPr>
+            <a:normAutofit fontScale="90000"/>
+          </a:bodyPr>
+          <a:lstStyle/>
+          <a:p>
+            <a:r>
+              <a:rPr lang="en-US" dirty="0"/>
+              <a:t>Create a QUEUE</a:t>
+            </a:r>
+          </a:p>
+        </p:txBody>
+      </p:sp>
+      <p:pic>
+        <p:nvPicPr>
+          <p:cNvPr id="4" name="Picture 3">
+            <a:extLst>
+              <a:ext uri="{FF2B5EF4-FFF2-40B4-BE49-F238E27FC236}">
+                <a16:creationId xmlns:a16="http://schemas.microsoft.com/office/drawing/2014/main" id="{5217400A-E767-4AD6-A598-AF7F322F7455}"/>
+              </a:ext>
+            </a:extLst>
+          </p:cNvPr>
+          <p:cNvPicPr>
+            <a:picLocks noChangeAspect="1"/>
+          </p:cNvPicPr>
+          <p:nvPr/>
+        </p:nvPicPr>
+        <p:blipFill>
+          <a:blip r:embed="rId2"/>
+          <a:stretch>
+            <a:fillRect/>
+          </a:stretch>
+        </p:blipFill>
+        <p:spPr>
+          <a:xfrm>
+            <a:off x="0" y="1323975"/>
+            <a:ext cx="3170984" cy="5534025"/>
+          </a:xfrm>
+          <a:prstGeom prst="rect">
+            <a:avLst/>
+          </a:prstGeom>
+        </p:spPr>
+      </p:pic>
+    </p:spTree>
+    <p:extLst>
+      <p:ext uri="{BB962C8B-B14F-4D97-AF65-F5344CB8AC3E}">
+        <p14:creationId xmlns:p14="http://schemas.microsoft.com/office/powerpoint/2010/main" val="682844470"/>
+      </p:ext>
+    </p:extLst>
+  </p:cSld>
+  <p:clrMapOvr>
+    <a:masterClrMapping/>
+  </p:clrMapOvr>
+</p:sld>
+</file>
+
 <file path=ppt/slides/slide2.xml><?xml version="1.0" encoding="utf-8"?>
 <p:sld xmlns:a="http://schemas.openxmlformats.org/drawingml/2006/main" xmlns:r="http://schemas.openxmlformats.org/officeDocument/2006/relationships" xmlns:p="http://schemas.openxmlformats.org/presentationml/2006/main">
   <p:cSld>
@@ -5781,6 +5877,24 @@
 </file>
 
 <file path=customXml/item1.xml><?xml version="1.0" encoding="utf-8"?>
+<p:properties xmlns:p="http://schemas.microsoft.com/office/2006/metadata/properties" xmlns:xsi="http://www.w3.org/2001/XMLSchema-instance" xmlns:pc="http://schemas.microsoft.com/office/infopath/2007/PartnerControls">
+  <documentManagement>
+    <Status xmlns="71af3243-3dd4-4a8d-8c0d-dd76da1f02a5">Not started</Status>
+    <MediaServiceKeyPoints xmlns="71af3243-3dd4-4a8d-8c0d-dd76da1f02a5" xsi:nil="true"/>
+  </documentManagement>
+</p:properties>
+</file>
+
+<file path=customXml/item2.xml><?xml version="1.0" encoding="utf-8"?>
+<?mso-contentType ?>
+<FormTemplates xmlns="http://schemas.microsoft.com/sharepoint/v3/contenttype/forms">
+  <Display>DocumentLibraryForm</Display>
+  <Edit>DocumentLibraryForm</Edit>
+  <New>DocumentLibraryForm</New>
+</FormTemplates>
+</file>
+
+<file path=customXml/item3.xml><?xml version="1.0" encoding="utf-8"?>
 <ct:contentTypeSchema xmlns:ct="http://schemas.microsoft.com/office/2006/metadata/contentType" xmlns:ma="http://schemas.microsoft.com/office/2006/metadata/properties/metaAttributes" ct:_="" ma:_="" ma:contentTypeName="Document" ma:contentTypeID="0x01010079F111ED35F8CC479449609E8A0923A6" ma:contentTypeVersion="12" ma:contentTypeDescription="Create a new document." ma:contentTypeScope="" ma:versionID="a410dd7f93c95333ffa1b60ed6adedd1">
   <xsd:schema xmlns:xsd="http://www.w3.org/2001/XMLSchema" xmlns:xs="http://www.w3.org/2001/XMLSchema" xmlns:p="http://schemas.microsoft.com/office/2006/metadata/properties" xmlns:ns2="71af3243-3dd4-4a8d-8c0d-dd76da1f02a5" xmlns:ns3="16c05727-aa75-4e4a-9b5f-8a80a1165891" targetNamespace="http://schemas.microsoft.com/office/2006/metadata/properties" ma:root="true" ma:fieldsID="a936d9baba76aa3866493feff160faab" ns2:_="" ns3:_="">
     <xsd:import namespace="71af3243-3dd4-4a8d-8c0d-dd76da1f02a5"/>
@@ -6001,25 +6115,25 @@
 </ct:contentTypeSchema>
 </file>
 
-<file path=customXml/item2.xml><?xml version="1.0" encoding="utf-8"?>
-<?mso-contentType ?>
-<FormTemplates xmlns="http://schemas.microsoft.com/sharepoint/v3/contenttype/forms">
-  <Display>DocumentLibraryForm</Display>
-  <Edit>DocumentLibraryForm</Edit>
-  <New>DocumentLibraryForm</New>
-</FormTemplates>
+<file path=customXml/itemProps1.xml><?xml version="1.0" encoding="utf-8"?>
+<ds:datastoreItem xmlns:ds="http://schemas.openxmlformats.org/officeDocument/2006/customXml" ds:itemID="{8D289AE2-D2AE-49D1-AFAC-3A79F6794255}">
+  <ds:schemaRefs>
+    <ds:schemaRef ds:uri="http://schemas.microsoft.com/office/2006/metadata/properties"/>
+    <ds:schemaRef ds:uri="http://schemas.microsoft.com/office/infopath/2007/PartnerControls"/>
+    <ds:schemaRef ds:uri="71af3243-3dd4-4a8d-8c0d-dd76da1f02a5"/>
+  </ds:schemaRefs>
+</ds:datastoreItem>
 </file>
 
-<file path=customXml/item3.xml><?xml version="1.0" encoding="utf-8"?>
-<p:properties xmlns:p="http://schemas.microsoft.com/office/2006/metadata/properties" xmlns:xsi="http://www.w3.org/2001/XMLSchema-instance" xmlns:pc="http://schemas.microsoft.com/office/infopath/2007/PartnerControls">
-  <documentManagement>
-    <Status xmlns="71af3243-3dd4-4a8d-8c0d-dd76da1f02a5">Not started</Status>
-    <MediaServiceKeyPoints xmlns="71af3243-3dd4-4a8d-8c0d-dd76da1f02a5" xsi:nil="true"/>
-  </documentManagement>
-</p:properties>
+<file path=customXml/itemProps2.xml><?xml version="1.0" encoding="utf-8"?>
+<ds:datastoreItem xmlns:ds="http://schemas.openxmlformats.org/officeDocument/2006/customXml" ds:itemID="{927BD4C1-B6B1-4715-ABF9-E660A51A4EA0}">
+  <ds:schemaRefs>
+    <ds:schemaRef ds:uri="http://schemas.microsoft.com/sharepoint/v3/contenttype/forms"/>
+  </ds:schemaRefs>
+</ds:datastoreItem>
 </file>
 
-<file path=customXml/itemProps1.xml><?xml version="1.0" encoding="utf-8"?>
+<file path=customXml/itemProps3.xml><?xml version="1.0" encoding="utf-8"?>
 <ds:datastoreItem xmlns:ds="http://schemas.openxmlformats.org/officeDocument/2006/customXml" ds:itemID="{41E7CA09-9778-4414-AE97-8064B12DA30E}">
   <ds:schemaRefs>
     <ds:schemaRef ds:uri="http://schemas.microsoft.com/office/2006/metadata/contentType"/>
@@ -6036,22 +6150,4 @@
     <ds:schemaRef ds:uri="http://schemas.microsoft.com/internal/obd"/>
   </ds:schemaRefs>
 </ds:datastoreItem>
-</file>
-
-<file path=customXml/itemProps2.xml><?xml version="1.0" encoding="utf-8"?>
-<ds:datastoreItem xmlns:ds="http://schemas.openxmlformats.org/officeDocument/2006/customXml" ds:itemID="{927BD4C1-B6B1-4715-ABF9-E660A51A4EA0}">
-  <ds:schemaRefs>
-    <ds:schemaRef ds:uri="http://schemas.microsoft.com/sharepoint/v3/contenttype/forms"/>
-  </ds:schemaRefs>
-</ds:datastoreItem>
-</file>
-
-<file path=customXml/itemProps3.xml><?xml version="1.0" encoding="utf-8"?>
-<ds:datastoreItem xmlns:ds="http://schemas.openxmlformats.org/officeDocument/2006/customXml" ds:itemID="{8D289AE2-D2AE-49D1-AFAC-3A79F6794255}">
-  <ds:schemaRefs>
-    <ds:schemaRef ds:uri="http://schemas.microsoft.com/office/2006/metadata/properties"/>
-    <ds:schemaRef ds:uri="http://schemas.microsoft.com/office/infopath/2007/PartnerControls"/>
-    <ds:schemaRef ds:uri="71af3243-3dd4-4a8d-8c0d-dd76da1f02a5"/>
-  </ds:schemaRefs>
-</ds:datastoreItem>
 </file>
</xml_diff>